<commit_message>
Site updated: 2021-10-12 18:35:49
</commit_message>
<xml_diff>
--- a/2021/10/12/2021-10-12-blind-spot-about-sklearn-confusion-matrix/confusion_matrix.pptx
+++ b/2021/10/12/2021-10-12-blind-spot-about-sklearn-confusion-matrix/confusion_matrix.pptx
@@ -104,6 +104,11 @@
       </a:defRPr>
     </a:lvl9pPr>
   </p:defaultTextStyle>
+  <p:extLst>
+    <p:ext uri="{EFAFB233-063F-42B5-8137-9DF3F51BA10A}">
+      <p15:sldGuideLst xmlns:p15="http://schemas.microsoft.com/office/powerpoint/2012/main"/>
+    </p:ext>
+  </p:extLst>
 </p:presentation>
 </file>
 
@@ -3604,7 +3609,7 @@
           <p:nvPr>
             <p:extLst>
               <p:ext uri="{D42A27DB-BD31-4B8C-83A1-F6EECF244321}">
-                <p14:modId xmlns:p14="http://schemas.microsoft.com/office/powerpoint/2010/main" val="2161057965"/>
+                <p14:modId xmlns:p14="http://schemas.microsoft.com/office/powerpoint/2010/main" val="1498547611"/>
               </p:ext>
             </p:extLst>
           </p:nvPr>
@@ -3677,7 +3682,7 @@
                       <a:pPr algn="ctr"/>
                       <a:r>
                         <a:rPr lang="en-US" altLang="zh-TW" dirty="0"/>
-                        <a:t>Ground truth</a:t>
+                        <a:t>Predicted</a:t>
                       </a:r>
                       <a:endParaRPr lang="zh-TW" altLang="en-US" dirty="0"/>
                     </a:p>

</xml_diff>

<commit_message>
Site updated: 2021-10-12 18:38:06
</commit_message>
<xml_diff>
--- a/2021/10/12/2021-10-12-blind-spot-about-sklearn-confusion-matrix/confusion_matrix.pptx
+++ b/2021/10/12/2021-10-12-blind-spot-about-sklearn-confusion-matrix/confusion_matrix.pptx
@@ -3609,7 +3609,7 @@
           <p:nvPr>
             <p:extLst>
               <p:ext uri="{D42A27DB-BD31-4B8C-83A1-F6EECF244321}">
-                <p14:modId xmlns:p14="http://schemas.microsoft.com/office/powerpoint/2010/main" val="1498547611"/>
+                <p14:modId xmlns:p14="http://schemas.microsoft.com/office/powerpoint/2010/main" val="311998030"/>
               </p:ext>
             </p:extLst>
           </p:nvPr>
@@ -3793,7 +3793,7 @@
                       <a:pPr algn="ctr"/>
                       <a:r>
                         <a:rPr lang="en-US" altLang="zh-TW" dirty="0"/>
-                        <a:t>False positive (FP)</a:t>
+                        <a:t>False negative (FN)</a:t>
                       </a:r>
                       <a:endParaRPr lang="zh-TW" altLang="en-US" dirty="0"/>
                     </a:p>
@@ -3830,7 +3830,7 @@
                       <a:pPr algn="ctr"/>
                       <a:r>
                         <a:rPr lang="en-US" altLang="zh-TW" dirty="0"/>
-                        <a:t>False negative (FN)</a:t>
+                        <a:t>False positive (FP)</a:t>
                       </a:r>
                       <a:endParaRPr lang="zh-TW" altLang="en-US" dirty="0"/>
                     </a:p>

</xml_diff>